<commit_message>
fix(2025/templates): improve colour scheme
</commit_message>
<xml_diff>
--- a/2025/templates/aoscc-2025-template-v1.pptx
+++ b/2025/templates/aoscc-2025-template-v1.pptx
@@ -669,7 +669,7 @@
               </a:lnSpc>
               <a:defRPr sz="4575" b="0">
                 <a:solidFill>
-                  <a:srgbClr val="B5B5B5"/>
+                  <a:schemeClr val="bg1"/>
                 </a:solidFill>
                 <a:latin typeface="MiSans Demibold" charset="-122"/>
                 <a:ea typeface="MiSans Demibold" charset="-122"/>
@@ -713,7 +713,7 @@
               <a:buNone/>
               <a:defRPr sz="3050">
                 <a:solidFill>
-                  <a:srgbClr val="B5B5B5"/>
+                  <a:schemeClr val="bg1"/>
                 </a:solidFill>
                 <a:latin typeface="MiSans Normal" charset="-122"/>
                 <a:ea typeface="MiSans Normal" charset="-122"/>
@@ -783,7 +783,7 @@
             <a:lvl1pPr>
               <a:defRPr>
                 <a:solidFill>
-                  <a:srgbClr val="B5B5B5"/>
+                  <a:schemeClr val="bg1"/>
                 </a:solidFill>
                 <a:latin typeface="MiSans" charset="-122"/>
                 <a:ea typeface="MiSans" charset="-122"/>
@@ -820,7 +820,7 @@
             <a:lvl1pPr>
               <a:defRPr>
                 <a:solidFill>
-                  <a:srgbClr val="B5B5B5"/>
+                  <a:schemeClr val="bg1"/>
                 </a:solidFill>
                 <a:latin typeface="MiSans" charset="-122"/>
                 <a:ea typeface="MiSans" charset="-122"/>
@@ -868,7 +868,7 @@
               <a:buNone/>
               <a:defRPr sz="2285">
                 <a:solidFill>
-                  <a:srgbClr val="B5B5B5"/>
+                  <a:schemeClr val="bg1"/>
                 </a:solidFill>
                 <a:latin typeface="MiSans Medium" charset="-122"/>
                 <a:ea typeface="MiSans Medium" charset="-122"/>
@@ -917,7 +917,7 @@
               <a:buNone/>
               <a:defRPr sz="2285">
                 <a:solidFill>
-                  <a:srgbClr val="B5B5B5"/>
+                  <a:schemeClr val="bg1"/>
                 </a:solidFill>
                 <a:latin typeface="MiSans Medium" charset="-122"/>
                 <a:ea typeface="MiSans Medium" charset="-122"/>
@@ -980,9 +980,9 @@
         <p:grpSpPr>
           <a:xfrm>
             <a:off x="952486" y="1198062"/>
-            <a:ext cx="6877641" cy="685981"/>
+            <a:ext cx="6447112" cy="685981"/>
             <a:chOff x="2053087" y="1201546"/>
-            <a:chExt cx="5950795" cy="720000"/>
+            <a:chExt cx="5578285" cy="720000"/>
           </a:xfrm>
         </p:grpSpPr>
         <p:sp>
@@ -1010,7 +1010,7 @@
               <a:r>
                 <a:rPr lang="en-US" altLang="zh-CN" sz="3810" dirty="0">
                   <a:solidFill>
-                    <a:srgbClr val="B5B5B5"/>
+                    <a:schemeClr val="bg1"/>
                   </a:solidFill>
                   <a:latin typeface="MiSans Medium" charset="-122"/>
                   <a:ea typeface="MiSans Medium" charset="-122"/>
@@ -1020,7 +1020,7 @@
               </a:r>
               <a:endParaRPr lang="en-US" altLang="zh-CN" sz="3810" dirty="0">
                 <a:solidFill>
-                  <a:srgbClr val="B5B5B5"/>
+                  <a:schemeClr val="bg1"/>
                 </a:solidFill>
                 <a:latin typeface="MiSans Medium" charset="-122"/>
                 <a:ea typeface="MiSans Medium" charset="-122"/>
@@ -1037,7 +1037,7 @@
           </p:nvCxnSpPr>
           <p:spPr>
             <a:xfrm>
-              <a:off x="5304796" y="1251322"/>
+              <a:off x="4932286" y="1251322"/>
               <a:ext cx="0" cy="576000"/>
             </a:xfrm>
             <a:prstGeom prst="line">
@@ -1045,7 +1045,7 @@
             </a:prstGeom>
             <a:ln w="25400">
               <a:solidFill>
-                <a:srgbClr val="C00000"/>
+                <a:srgbClr val="FF0000"/>
               </a:solidFill>
             </a:ln>
           </p:spPr>
@@ -1072,7 +1072,7 @@
           </p:nvSpPr>
           <p:spPr>
             <a:xfrm>
-              <a:off x="5447604" y="1201546"/>
+              <a:off x="5075094" y="1201546"/>
               <a:ext cx="2556278" cy="720000"/>
             </a:xfrm>
             <a:prstGeom prst="rect">
@@ -1089,7 +1089,7 @@
               <a:r>
                 <a:rPr lang="zh-CN" altLang="en-US" sz="3620" dirty="0">
                   <a:solidFill>
-                    <a:srgbClr val="C00000"/>
+                    <a:srgbClr val="FF3535"/>
                   </a:solidFill>
                   <a:latin typeface="MiSans Medium" charset="-122"/>
                   <a:ea typeface="MiSans Medium" charset="-122"/>
@@ -1098,7 +1098,7 @@
               </a:r>
               <a:endParaRPr lang="zh-CN" altLang="en-US" sz="3620" dirty="0">
                 <a:solidFill>
-                  <a:srgbClr val="C00000"/>
+                  <a:srgbClr val="FF3535"/>
                 </a:solidFill>
                 <a:latin typeface="MiSans Medium" charset="-122"/>
                 <a:ea typeface="MiSans Medium" charset="-122"/>
@@ -1154,7 +1154,11 @@
           </a:bodyPr>
           <a:lstStyle>
             <a:lvl1pPr>
-              <a:defRPr lang="en-US" dirty="0"/>
+              <a:defRPr lang="en-US" dirty="0">
+                <a:solidFill>
+                  <a:schemeClr val="bg1"/>
+                </a:solidFill>
+              </a:defRPr>
             </a:lvl1pPr>
           </a:lstStyle>
           <a:p>
@@ -1198,7 +1202,11 @@
               <a:spcBef>
                 <a:spcPts val="0"/>
               </a:spcBef>
-              <a:defRPr sz="2400"/>
+              <a:defRPr sz="2400">
+                <a:solidFill>
+                  <a:schemeClr val="bg1"/>
+                </a:solidFill>
+              </a:defRPr>
             </a:lvl1pPr>
             <a:lvl2pPr marL="857250" indent="-342900" eaLnBrk="1" fontAlgn="auto" latinLnBrk="0" hangingPunct="1">
               <a:lnSpc>
@@ -1207,7 +1215,11 @@
               <a:spcBef>
                 <a:spcPts val="0"/>
               </a:spcBef>
-              <a:defRPr sz="2000"/>
+              <a:defRPr sz="2000">
+                <a:solidFill>
+                  <a:schemeClr val="bg1"/>
+                </a:solidFill>
+              </a:defRPr>
             </a:lvl2pPr>
             <a:lvl3pPr marL="1200150" eaLnBrk="1" fontAlgn="auto" latinLnBrk="0" hangingPunct="1">
               <a:lnSpc>
@@ -1216,7 +1228,11 @@
               <a:spcBef>
                 <a:spcPts val="0"/>
               </a:spcBef>
-              <a:defRPr sz="1800"/>
+              <a:defRPr sz="1800">
+                <a:solidFill>
+                  <a:schemeClr val="bg1"/>
+                </a:solidFill>
+              </a:defRPr>
             </a:lvl3pPr>
             <a:lvl4pPr eaLnBrk="1" fontAlgn="auto" latinLnBrk="0" hangingPunct="1">
               <a:lnSpc>
@@ -1225,7 +1241,11 @@
               <a:spcBef>
                 <a:spcPts val="0"/>
               </a:spcBef>
-              <a:defRPr sz="1600"/>
+              <a:defRPr sz="1600">
+                <a:solidFill>
+                  <a:schemeClr val="bg1"/>
+                </a:solidFill>
+              </a:defRPr>
             </a:lvl4pPr>
             <a:lvl5pPr eaLnBrk="1" fontAlgn="auto" latinLnBrk="0" hangingPunct="1">
               <a:lnSpc>
@@ -1234,7 +1254,11 @@
               <a:spcBef>
                 <a:spcPts val="0"/>
               </a:spcBef>
-              <a:defRPr sz="1600"/>
+              <a:defRPr sz="1600">
+                <a:solidFill>
+                  <a:schemeClr val="bg1"/>
+                </a:solidFill>
+              </a:defRPr>
             </a:lvl5pPr>
           </a:lstStyle>
           <a:p>
@@ -1673,7 +1697,7 @@
             <a:r>
               <a:rPr lang="zh-CN" altLang="en-US" sz="16480" dirty="0">
                 <a:solidFill>
-                  <a:srgbClr val="C00000"/>
+                  <a:srgbClr val="FF3535"/>
                 </a:solidFill>
                 <a:latin typeface="MiSans Demibold" charset="-122"/>
                 <a:ea typeface="MiSans Demibold" charset="-122"/>
@@ -1683,7 +1707,7 @@
             </a:r>
             <a:endParaRPr lang="zh-CN" altLang="en-US" sz="16480" dirty="0">
               <a:solidFill>
-                <a:srgbClr val="C00000"/>
+                <a:srgbClr val="FF3535"/>
               </a:solidFill>
               <a:latin typeface="MiSans Demibold" charset="-122"/>
               <a:ea typeface="MiSans Demibold" charset="-122"/>
@@ -1838,7 +1862,7 @@
             <a:r>
               <a:rPr lang="zh-CN" altLang="en-US" sz="16480" dirty="0">
                 <a:solidFill>
-                  <a:srgbClr val="C00000"/>
+                  <a:srgbClr val="FF3535"/>
                 </a:solidFill>
                 <a:latin typeface="MiSans Demibold" charset="-122"/>
                 <a:ea typeface="MiSans Demibold" charset="-122"/>
@@ -1848,7 +1872,7 @@
             </a:r>
             <a:endParaRPr lang="zh-CN" altLang="en-US" sz="16480" dirty="0">
               <a:solidFill>
-                <a:srgbClr val="C00000"/>
+                <a:srgbClr val="FF3535"/>
               </a:solidFill>
               <a:latin typeface="MiSans Demibold" charset="-122"/>
               <a:ea typeface="MiSans Demibold" charset="-122"/>
@@ -1952,9 +1976,7 @@
             <a:lvl1pPr algn="l">
               <a:defRPr sz="1525">
                 <a:solidFill>
-                  <a:schemeClr val="tx1">
-                    <a:tint val="75000"/>
-                  </a:schemeClr>
+                  <a:schemeClr val="bg1"/>
                 </a:solidFill>
                 <a:latin typeface="MiSans" charset="-122"/>
                 <a:ea typeface="MiSans" charset="-122"/>
@@ -1994,9 +2016,7 @@
             <a:lvl1pPr algn="ctr">
               <a:defRPr sz="1525">
                 <a:solidFill>
-                  <a:schemeClr val="tx1">
-                    <a:tint val="75000"/>
-                  </a:schemeClr>
+                  <a:schemeClr val="bg1"/>
                 </a:solidFill>
                 <a:latin typeface="MiSans" charset="-122"/>
                 <a:ea typeface="MiSans" charset="-122"/>
@@ -2146,7 +2166,7 @@
         <a:buNone/>
         <a:defRPr sz="4190" kern="1200">
           <a:solidFill>
-            <a:srgbClr val="B5B5B5"/>
+            <a:schemeClr val="bg1"/>
           </a:solidFill>
           <a:latin typeface="MiSans Demibold" charset="-122"/>
           <a:ea typeface="MiSans Demibold" charset="-122"/>
@@ -2166,7 +2186,7 @@
         <a:buChar char="•"/>
         <a:defRPr sz="2665" kern="1200">
           <a:solidFill>
-            <a:srgbClr val="B5B5B5"/>
+            <a:schemeClr val="bg1"/>
           </a:solidFill>
           <a:latin typeface="MiSans Medium" charset="-122"/>
           <a:ea typeface="MiSans Medium" charset="-122"/>
@@ -2184,7 +2204,7 @@
         <a:buChar char="•"/>
         <a:defRPr sz="2285" kern="1200">
           <a:solidFill>
-            <a:srgbClr val="B5B5B5"/>
+            <a:schemeClr val="bg1"/>
           </a:solidFill>
           <a:latin typeface="MiSans Medium" charset="-122"/>
           <a:ea typeface="MiSans Medium" charset="-122"/>
@@ -2202,7 +2222,7 @@
         <a:buChar char="•"/>
         <a:defRPr sz="1905" kern="1200">
           <a:solidFill>
-            <a:srgbClr val="B5B5B5"/>
+            <a:schemeClr val="bg1"/>
           </a:solidFill>
           <a:latin typeface="MiSans Medium" charset="-122"/>
           <a:ea typeface="MiSans Medium" charset="-122"/>
@@ -2220,7 +2240,7 @@
         <a:buChar char="•"/>
         <a:defRPr sz="1715" kern="1200">
           <a:solidFill>
-            <a:srgbClr val="B5B5B5"/>
+            <a:schemeClr val="bg1"/>
           </a:solidFill>
           <a:latin typeface="MiSans Medium" charset="-122"/>
           <a:ea typeface="MiSans Medium" charset="-122"/>
@@ -2238,7 +2258,7 @@
         <a:buChar char="•"/>
         <a:defRPr sz="1715" kern="1200">
           <a:solidFill>
-            <a:srgbClr val="B5B5B5"/>
+            <a:schemeClr val="bg1"/>
           </a:solidFill>
           <a:latin typeface="MiSans Medium" charset="-122"/>
           <a:ea typeface="MiSans Medium" charset="-122"/>

</xml_diff>

<commit_message>
fix(2025/tempate): update color of the accent bar
</commit_message>
<xml_diff>
--- a/2025/templates/aoscc-2025-template-v1.pptx
+++ b/2025/templates/aoscc-2025-template-v1.pptx
@@ -5,20 +5,20 @@
     <p:sldMasterId id="2147483648" r:id="rId1"/>
   </p:sldMasterIdLst>
   <p:notesMasterIdLst>
-    <p:notesMasterId r:id="rId6"/>
+    <p:notesMasterId r:id="rId5"/>
   </p:notesMasterIdLst>
   <p:handoutMasterIdLst>
-    <p:handoutMasterId r:id="rId7"/>
+    <p:handoutMasterId r:id="rId6"/>
   </p:handoutMasterIdLst>
   <p:sldIdLst>
-    <p:sldId id="256" r:id="rId3"/>
-    <p:sldId id="261" r:id="rId4"/>
-    <p:sldId id="262" r:id="rId5"/>
+    <p:sldId id="256" r:id="rId2"/>
+    <p:sldId id="261" r:id="rId3"/>
+    <p:sldId id="262" r:id="rId4"/>
   </p:sldIdLst>
   <p:sldSz cx="12192000" cy="6858000"/>
   <p:notesSz cx="6858000" cy="9144000"/>
   <p:custDataLst>
-    <p:tags r:id="rId11"/>
+    <p:tags r:id="rId7"/>
   </p:custDataLst>
   <p:defaultTextStyle>
     <a:defPPr>
@@ -115,6 +115,14 @@
       </a:defRPr>
     </a:lvl9pPr>
   </p:defaultTextStyle>
+  <p:extLst>
+    <p:ext uri="{EFAFB233-063F-42B5-8137-9DF3F51BA10A}">
+      <p15:sldGuideLst xmlns:p15="http://schemas.microsoft.com/office/powerpoint/2012/main"/>
+    </p:ext>
+    <p:ext uri="{2D200454-40CA-4A62-9FC3-DE9A4176ACB9}">
+      <p15:notesGuideLst xmlns:p15="http://schemas.microsoft.com/office/powerpoint/2012/main"/>
+    </p:ext>
+  </p:extLst>
 </p:presentation>
 </file>
 
@@ -200,6 +208,7 @@
           <a:p>
             <a:fld id="{A241A0E9-9F85-4466-91EC-B9D1A5CDE469}" type="datetimeFigureOut">
               <a:rPr lang="zh-CN" altLang="en-US" smtClean="0"/>
+              <a:t>2025/7/13</a:t>
             </a:fld>
             <a:endParaRPr lang="zh-CN" altLang="en-US"/>
           </a:p>
@@ -265,12 +274,18 @@
           <a:p>
             <a:fld id="{181E4AE4-53D1-4F2B-BA35-167C432B2381}" type="slidenum">
               <a:rPr lang="zh-CN" altLang="en-US" smtClean="0"/>
+              <a:t>‹#›</a:t>
             </a:fld>
             <a:endParaRPr lang="zh-CN" altLang="en-US"/>
           </a:p>
         </p:txBody>
       </p:sp>
     </p:spTree>
+    <p:extLst>
+      <p:ext uri="{BB962C8B-B14F-4D97-AF65-F5344CB8AC3E}">
+        <p14:creationId xmlns:p14="http://schemas.microsoft.com/office/powerpoint/2010/main" val="1"/>
+      </p:ext>
+    </p:extLst>
   </p:cSld>
   <p:clrMap bg1="lt1" tx1="dk1" bg2="lt2" tx2="dk2" accent1="accent1" accent2="accent2" accent3="accent3" accent4="accent4" accent5="accent5" accent6="accent6" hlink="hlink" folHlink="folHlink"/>
   <p:hf hdr="0" ftr="0" dt="0"/>
@@ -359,6 +374,7 @@
           <a:p>
             <a:fld id="{3CED8964-C77F-4CB7-9F84-7EB7D31F2103}" type="datetimeFigureOut">
               <a:rPr lang="zh-CN" altLang="en-US" smtClean="0"/>
+              <a:t>2025/7/13</a:t>
             </a:fld>
             <a:endParaRPr lang="zh-CN" altLang="en-US"/>
           </a:p>
@@ -425,7 +441,6 @@
               <a:rPr lang="zh-CN" altLang="en-US"/>
               <a:t>单击此处编辑母版文本样式</a:t>
             </a:r>
-            <a:endParaRPr lang="zh-CN" altLang="en-US"/>
           </a:p>
           <a:p>
             <a:pPr lvl="1"/>
@@ -433,7 +448,6 @@
               <a:rPr lang="zh-CN" altLang="en-US"/>
               <a:t>二级</a:t>
             </a:r>
-            <a:endParaRPr lang="zh-CN" altLang="en-US"/>
           </a:p>
           <a:p>
             <a:pPr lvl="2"/>
@@ -441,7 +455,6 @@
               <a:rPr lang="zh-CN" altLang="en-US"/>
               <a:t>三级</a:t>
             </a:r>
-            <a:endParaRPr lang="zh-CN" altLang="en-US"/>
           </a:p>
           <a:p>
             <a:pPr lvl="3"/>
@@ -449,7 +462,6 @@
               <a:rPr lang="zh-CN" altLang="en-US"/>
               <a:t>四级</a:t>
             </a:r>
-            <a:endParaRPr lang="zh-CN" altLang="en-US"/>
           </a:p>
           <a:p>
             <a:pPr lvl="4"/>
@@ -457,7 +469,6 @@
               <a:rPr lang="zh-CN" altLang="en-US"/>
               <a:t>五级</a:t>
             </a:r>
-            <a:endParaRPr lang="zh-CN" altLang="en-US"/>
           </a:p>
         </p:txBody>
       </p:sp>
@@ -521,6 +532,7 @@
           <a:p>
             <a:fld id="{8B977A81-A92E-49D7-A0D9-5EAE52519BB4}" type="slidenum">
               <a:rPr lang="zh-CN" altLang="en-US" smtClean="0"/>
+              <a:t>‹#›</a:t>
             </a:fld>
             <a:endParaRPr lang="zh-CN" altLang="en-US"/>
           </a:p>
@@ -626,7 +638,7 @@
 </file>
 
 <file path=ppt/slideLayouts/slideLayout1.xml><?xml version="1.0" encoding="utf-8"?>
-<p:sldLayout xmlns:a="http://schemas.openxmlformats.org/drawingml/2006/main" xmlns:r="http://schemas.openxmlformats.org/officeDocument/2006/relationships" xmlns:p="http://schemas.openxmlformats.org/presentationml/2006/main" preserve="1" showMasterSp="0" userDrawn="1">
+<p:sldLayout xmlns:a="http://schemas.openxmlformats.org/drawingml/2006/main" xmlns:r="http://schemas.openxmlformats.org/officeDocument/2006/relationships" xmlns:p="http://schemas.openxmlformats.org/presentationml/2006/main" showMasterSp="0" preserve="1" userDrawn="1">
   <p:cSld name="标题幻灯片">
     <p:spTree>
       <p:nvGrpSpPr>
@@ -793,6 +805,7 @@
           <a:p>
             <a:fld id="{86F49568-C05D-465E-8327-DF205A04034D}" type="datetime1">
               <a:rPr lang="zh-CN" altLang="en-US" smtClean="0"/>
+              <a:t>2025/7/13</a:t>
             </a:fld>
             <a:endParaRPr lang="zh-CN" altLang="en-US"/>
           </a:p>
@@ -881,7 +894,6 @@
               <a:rPr lang="zh-CN" altLang="en-US" dirty="0"/>
               <a:t>单击此处添加演讲者</a:t>
             </a:r>
-            <a:endParaRPr lang="zh-CN" altLang="en-US" dirty="0"/>
           </a:p>
         </p:txBody>
       </p:sp>
@@ -930,7 +942,6 @@
               <a:rPr lang="zh-CN" altLang="en-US" dirty="0"/>
               <a:t>单击此处添加演讲者</a:t>
             </a:r>
-            <a:endParaRPr lang="zh-CN" altLang="en-US" dirty="0"/>
           </a:p>
         </p:txBody>
       </p:sp>
@@ -1018,14 +1029,6 @@
                 </a:rPr>
                 <a:t>AOSCC 2025</a:t>
               </a:r>
-              <a:endParaRPr lang="en-US" altLang="zh-CN" sz="3810" dirty="0">
-                <a:solidFill>
-                  <a:schemeClr val="bg1"/>
-                </a:solidFill>
-                <a:latin typeface="MiSans Medium" charset="-122"/>
-                <a:ea typeface="MiSans Medium" charset="-122"/>
-                <a:cs typeface="Open Sans" pitchFamily="2" charset="0"/>
-              </a:endParaRPr>
             </a:p>
           </p:txBody>
         </p:sp>
@@ -1096,13 +1099,6 @@
                 </a:rPr>
                 <a:t>欢迎</a:t>
               </a:r>
-              <a:endParaRPr lang="zh-CN" altLang="en-US" sz="3620" dirty="0">
-                <a:solidFill>
-                  <a:srgbClr val="FF3535"/>
-                </a:solidFill>
-                <a:latin typeface="MiSans Medium" charset="-122"/>
-                <a:ea typeface="MiSans Medium" charset="-122"/>
-              </a:endParaRPr>
             </a:p>
           </p:txBody>
         </p:sp>
@@ -1267,7 +1263,6 @@
               <a:rPr lang="zh-CN" altLang="en-US"/>
               <a:t>单击此处编辑母版文本样式</a:t>
             </a:r>
-            <a:endParaRPr lang="zh-CN" altLang="en-US"/>
           </a:p>
           <a:p>
             <a:pPr lvl="1"/>
@@ -1275,7 +1270,6 @@
               <a:rPr lang="zh-CN" altLang="en-US"/>
               <a:t>二级</a:t>
             </a:r>
-            <a:endParaRPr lang="zh-CN" altLang="en-US"/>
           </a:p>
           <a:p>
             <a:pPr lvl="2"/>
@@ -1283,7 +1277,6 @@
               <a:rPr lang="zh-CN" altLang="en-US"/>
               <a:t>三级</a:t>
             </a:r>
-            <a:endParaRPr lang="zh-CN" altLang="en-US"/>
           </a:p>
           <a:p>
             <a:pPr lvl="3"/>
@@ -1291,7 +1284,6 @@
               <a:rPr lang="zh-CN" altLang="en-US"/>
               <a:t>四级</a:t>
             </a:r>
-            <a:endParaRPr lang="zh-CN" altLang="en-US"/>
           </a:p>
           <a:p>
             <a:pPr lvl="4"/>
@@ -1340,6 +1332,7 @@
           <a:p>
             <a:fld id="{3C8BA057-24B4-4F7D-8797-4FCDAD2FC515}" type="datetime1">
               <a:rPr lang="zh-CN" altLang="en-US" smtClean="0"/>
+              <a:t>2025/7/13</a:t>
             </a:fld>
             <a:endParaRPr lang="zh-CN" altLang="en-US"/>
           </a:p>
@@ -1464,7 +1457,6 @@
               <a:rPr lang="zh-CN" altLang="en-US"/>
               <a:t>单击此处编辑母版文本样式</a:t>
             </a:r>
-            <a:endParaRPr lang="zh-CN" altLang="en-US"/>
           </a:p>
           <a:p>
             <a:pPr lvl="1"/>
@@ -1472,7 +1464,6 @@
               <a:rPr lang="zh-CN" altLang="en-US"/>
               <a:t>二级</a:t>
             </a:r>
-            <a:endParaRPr lang="zh-CN" altLang="en-US"/>
           </a:p>
           <a:p>
             <a:pPr lvl="2"/>
@@ -1480,7 +1471,6 @@
               <a:rPr lang="zh-CN" altLang="en-US"/>
               <a:t>三级</a:t>
             </a:r>
-            <a:endParaRPr lang="zh-CN" altLang="en-US"/>
           </a:p>
           <a:p>
             <a:pPr lvl="3"/>
@@ -1488,7 +1478,6 @@
               <a:rPr lang="zh-CN" altLang="en-US"/>
               <a:t>四级</a:t>
             </a:r>
-            <a:endParaRPr lang="zh-CN" altLang="en-US"/>
           </a:p>
           <a:p>
             <a:pPr lvl="4"/>
@@ -1528,7 +1517,6 @@
               <a:rPr lang="zh-CN" altLang="en-US"/>
               <a:t>单击此处编辑母版文本样式</a:t>
             </a:r>
-            <a:endParaRPr lang="zh-CN" altLang="en-US"/>
           </a:p>
           <a:p>
             <a:pPr lvl="1"/>
@@ -1536,7 +1524,6 @@
               <a:rPr lang="zh-CN" altLang="en-US"/>
               <a:t>二级</a:t>
             </a:r>
-            <a:endParaRPr lang="zh-CN" altLang="en-US"/>
           </a:p>
           <a:p>
             <a:pPr lvl="2"/>
@@ -1544,7 +1531,6 @@
               <a:rPr lang="zh-CN" altLang="en-US"/>
               <a:t>三级</a:t>
             </a:r>
-            <a:endParaRPr lang="zh-CN" altLang="en-US"/>
           </a:p>
           <a:p>
             <a:pPr lvl="3"/>
@@ -1552,7 +1538,6 @@
               <a:rPr lang="zh-CN" altLang="en-US"/>
               <a:t>四级</a:t>
             </a:r>
-            <a:endParaRPr lang="zh-CN" altLang="en-US"/>
           </a:p>
           <a:p>
             <a:pPr lvl="4"/>
@@ -1599,6 +1584,7 @@
           <a:p>
             <a:fld id="{3C8BA057-24B4-4F7D-8797-4FCDAD2FC515}" type="datetime1">
               <a:rPr lang="zh-CN" altLang="en-US" sz="1525" smtClean="0"/>
+              <a:t>2025/7/13</a:t>
             </a:fld>
             <a:endParaRPr lang="zh-CN" altLang="en-US" sz="1525"/>
           </a:p>
@@ -1656,7 +1642,7 @@
 </file>
 
 <file path=ppt/slideLayouts/slideLayout4.xml><?xml version="1.0" encoding="utf-8"?>
-<p:sldLayout xmlns:a="http://schemas.openxmlformats.org/drawingml/2006/main" xmlns:r="http://schemas.openxmlformats.org/officeDocument/2006/relationships" xmlns:p="http://schemas.openxmlformats.org/presentationml/2006/main" preserve="1" showMasterSp="0" userDrawn="1">
+<p:sldLayout xmlns:a="http://schemas.openxmlformats.org/drawingml/2006/main" xmlns:r="http://schemas.openxmlformats.org/officeDocument/2006/relationships" xmlns:p="http://schemas.openxmlformats.org/presentationml/2006/main" showMasterSp="0" preserve="1" userDrawn="1">
   <p:cSld name="仅标题">
     <p:spTree>
       <p:nvGrpSpPr>
@@ -1705,14 +1691,6 @@
               </a:rPr>
               <a:t>“</a:t>
             </a:r>
-            <a:endParaRPr lang="zh-CN" altLang="en-US" sz="16480" dirty="0">
-              <a:solidFill>
-                <a:srgbClr val="FF3535"/>
-              </a:solidFill>
-              <a:latin typeface="MiSans Demibold" charset="-122"/>
-              <a:ea typeface="MiSans Demibold" charset="-122"/>
-              <a:cs typeface="MiSans Demibold" charset="-122"/>
-            </a:endParaRPr>
           </a:p>
         </p:txBody>
       </p:sp>
@@ -1748,7 +1726,6 @@
               <a:rPr lang="zh-CN" altLang="en-US"/>
               <a:t>单击此处编辑母版文本样式</a:t>
             </a:r>
-            <a:endParaRPr lang="zh-CN" altLang="en-US"/>
           </a:p>
         </p:txBody>
       </p:sp>
@@ -1789,6 +1766,7 @@
           <a:p>
             <a:fld id="{3C8BA057-24B4-4F7D-8797-4FCDAD2FC515}" type="datetime1">
               <a:rPr lang="zh-CN" altLang="en-US" smtClean="0"/>
+              <a:t>2025/7/13</a:t>
             </a:fld>
             <a:endParaRPr lang="zh-CN" altLang="en-US"/>
           </a:p>
@@ -1870,14 +1848,6 @@
               </a:rPr>
               <a:t>”</a:t>
             </a:r>
-            <a:endParaRPr lang="zh-CN" altLang="en-US" sz="16480" dirty="0">
-              <a:solidFill>
-                <a:srgbClr val="FF3535"/>
-              </a:solidFill>
-              <a:latin typeface="MiSans Demibold" charset="-122"/>
-              <a:ea typeface="MiSans Demibold" charset="-122"/>
-              <a:cs typeface="MiSans Demibold" charset="-122"/>
-            </a:endParaRPr>
           </a:p>
         </p:txBody>
       </p:sp>
@@ -1895,7 +1865,7 @@
     <p:bg>
       <p:bgPr>
         <a:blipFill dpi="0" rotWithShape="0">
-          <a:blip r:embed="rId5"/>
+          <a:blip r:embed="rId6"/>
           <a:srcRect/>
           <a:stretch>
             <a:fillRect/>
@@ -1986,6 +1956,7 @@
           <a:p>
             <a:fld id="{3C8BA057-24B4-4F7D-8797-4FCDAD2FC515}" type="datetime1">
               <a:rPr lang="zh-CN" altLang="en-US" smtClean="0"/>
+              <a:t>2025/7/13</a:t>
             </a:fld>
             <a:endParaRPr lang="zh-CN" altLang="en-US"/>
           </a:p>
@@ -2062,7 +2033,6 @@
               <a:rPr lang="zh-CN" altLang="en-US" dirty="0"/>
               <a:t>单击此处编辑母版文本样式</a:t>
             </a:r>
-            <a:endParaRPr lang="zh-CN" altLang="en-US" dirty="0"/>
           </a:p>
           <a:p>
             <a:pPr lvl="1"/>
@@ -2070,7 +2040,6 @@
               <a:rPr lang="zh-CN" altLang="en-US" dirty="0"/>
               <a:t>二级</a:t>
             </a:r>
-            <a:endParaRPr lang="zh-CN" altLang="en-US" dirty="0"/>
           </a:p>
           <a:p>
             <a:pPr lvl="2"/>
@@ -2078,7 +2047,6 @@
               <a:rPr lang="zh-CN" altLang="en-US" dirty="0"/>
               <a:t>三级</a:t>
             </a:r>
-            <a:endParaRPr lang="zh-CN" altLang="en-US" dirty="0"/>
           </a:p>
           <a:p>
             <a:pPr lvl="3"/>
@@ -2086,7 +2054,6 @@
               <a:rPr lang="zh-CN" altLang="en-US" dirty="0"/>
               <a:t>四级</a:t>
             </a:r>
-            <a:endParaRPr lang="zh-CN" altLang="en-US" dirty="0"/>
           </a:p>
           <a:p>
             <a:pPr lvl="4"/>
@@ -2094,7 +2061,6 @@
               <a:rPr lang="zh-CN" altLang="en-US" dirty="0"/>
               <a:t>五级</a:t>
             </a:r>
-            <a:endParaRPr lang="zh-CN" altLang="en-US" dirty="0"/>
           </a:p>
         </p:txBody>
       </p:sp>
@@ -2113,7 +2079,7 @@
             <a:avLst/>
           </a:prstGeom>
           <a:solidFill>
-            <a:srgbClr val="CA463A"/>
+            <a:srgbClr val="FF3535"/>
           </a:solidFill>
           <a:ln>
             <a:noFill/>
@@ -2446,7 +2412,14 @@
         <p:cNvGrpSpPr/>
         <p:nvPr/>
       </p:nvGrpSpPr>
-      <p:grpSpPr/>
+      <p:grpSpPr>
+        <a:xfrm>
+          <a:off x="0" y="0"/>
+          <a:ext cx="0" cy="0"/>
+          <a:chOff x="0" y="0"/>
+          <a:chExt cx="0" cy="0"/>
+        </a:xfrm>
+      </p:grpSpPr>
       <p:sp>
         <p:nvSpPr>
           <p:cNvPr id="2" name="标题 1"/>
@@ -2462,6 +2435,7 @@
           <a:bodyPr>
             <a:normAutofit/>
           </a:bodyPr>
+          <a:lstStyle/>
           <a:p>
             <a:r>
               <a:rPr lang="zh-CN" altLang="en-US">
@@ -2488,12 +2462,12 @@
           <a:bodyPr>
             <a:normAutofit fontScale="90000" lnSpcReduction="20000"/>
           </a:bodyPr>
+          <a:lstStyle/>
           <a:p>
             <a:r>
               <a:rPr lang="zh-CN" altLang="en-US"/>
               <a:t>为热爱一往无前</a:t>
             </a:r>
-            <a:endParaRPr lang="zh-CN" altLang="en-US"/>
           </a:p>
         </p:txBody>
       </p:sp>
@@ -2510,12 +2484,12 @@
         <p:spPr/>
         <p:txBody>
           <a:bodyPr/>
+          <a:lstStyle/>
           <a:p>
             <a:r>
               <a:rPr lang="zh-CN" altLang="en-US"/>
               <a:t>疾钀驚</a:t>
             </a:r>
-            <a:endParaRPr lang="zh-CN" altLang="en-US"/>
           </a:p>
         </p:txBody>
       </p:sp>
@@ -2534,6 +2508,7 @@
           <a:bodyPr>
             <a:normAutofit lnSpcReduction="10000"/>
           </a:bodyPr>
+          <a:lstStyle/>
           <a:p>
             <a:endParaRPr lang="zh-CN" altLang="en-US"/>
           </a:p>
@@ -2556,7 +2531,14 @@
         <p:cNvGrpSpPr/>
         <p:nvPr/>
       </p:nvGrpSpPr>
-      <p:grpSpPr/>
+      <p:grpSpPr>
+        <a:xfrm>
+          <a:off x="0" y="0"/>
+          <a:ext cx="0" cy="0"/>
+          <a:chOff x="0" y="0"/>
+          <a:chExt cx="0" cy="0"/>
+        </a:xfrm>
+      </p:grpSpPr>
       <p:sp>
         <p:nvSpPr>
           <p:cNvPr id="2" name="标题 1"/>
@@ -2572,12 +2554,12 @@
           <a:bodyPr>
             <a:normAutofit fontScale="90000"/>
           </a:bodyPr>
+          <a:lstStyle/>
           <a:p>
             <a:r>
               <a:rPr lang="zh-CN" altLang="en-US"/>
               <a:t>议程概览</a:t>
             </a:r>
-            <a:endParaRPr lang="zh-CN" altLang="en-US"/>
           </a:p>
         </p:txBody>
       </p:sp>
@@ -2594,6 +2576,7 @@
         <p:spPr/>
         <p:txBody>
           <a:bodyPr/>
+          <a:lstStyle/>
           <a:p>
             <a:r>
               <a:rPr lang="en-US"/>
@@ -2603,7 +2586,6 @@
               <a:rPr lang="zh-CN" altLang="en-US"/>
               <a:t>日程概览</a:t>
             </a:r>
-            <a:endParaRPr lang="zh-CN" altLang="en-US"/>
           </a:p>
           <a:p>
             <a:pPr lvl="1"/>
@@ -2611,7 +2593,6 @@
               <a:rPr lang="zh-CN" altLang="en-US"/>
               <a:t>讲者多少人？</a:t>
             </a:r>
-            <a:endParaRPr lang="zh-CN" altLang="en-US"/>
           </a:p>
           <a:p>
             <a:pPr lvl="2"/>
@@ -2619,7 +2600,6 @@
               <a:rPr lang="zh-CN" altLang="en-US"/>
               <a:t>课题多少种？</a:t>
             </a:r>
-            <a:endParaRPr lang="zh-CN" altLang="en-US"/>
           </a:p>
           <a:p>
             <a:pPr lvl="3"/>
@@ -2627,7 +2607,6 @@
               <a:rPr lang="zh-CN" altLang="en-US"/>
               <a:t>有没有抽票投奖？</a:t>
             </a:r>
-            <a:endParaRPr lang="zh-CN" altLang="en-US"/>
           </a:p>
         </p:txBody>
       </p:sp>
@@ -2648,7 +2627,14 @@
         <p:cNvGrpSpPr/>
         <p:nvPr/>
       </p:nvGrpSpPr>
-      <p:grpSpPr/>
+      <p:grpSpPr>
+        <a:xfrm>
+          <a:off x="0" y="0"/>
+          <a:ext cx="0" cy="0"/>
+          <a:chOff x="0" y="0"/>
+          <a:chExt cx="0" cy="0"/>
+        </a:xfrm>
+      </p:grpSpPr>
       <p:sp>
         <p:nvSpPr>
           <p:cNvPr id="4" name="文本占位符 3"/>
@@ -2662,6 +2648,7 @@
         <p:spPr/>
         <p:txBody>
           <a:bodyPr/>
+          <a:lstStyle/>
           <a:p>
             <a:endParaRPr lang="zh-CN" altLang="en-US" sz="3430"/>
           </a:p>
@@ -2677,7 +2664,6 @@
               <a:rPr lang="zh-CN" altLang="en-US"/>
               <a:t>投票！</a:t>
             </a:r>
-            <a:endParaRPr lang="zh-CN" altLang="en-US"/>
           </a:p>
         </p:txBody>
       </p:sp>
@@ -2690,8 +2676,8 @@
 </file>
 
 <file path=ppt/tags/tag1.xml><?xml version="1.0" encoding="utf-8"?>
-<p:tagLst xmlns:p="http://schemas.openxmlformats.org/presentationml/2006/main">
-  <p:tag name="commondata" val="eyJoZGlkIjoiZjBlOGVmNDg3MjdiOTQ0NGE3NGQyMTU1MjUyNjc4YTIifQ=="/>
+<p:tagLst xmlns:a="http://schemas.openxmlformats.org/drawingml/2006/main" xmlns:r="http://schemas.openxmlformats.org/officeDocument/2006/relationships" xmlns:p="http://schemas.openxmlformats.org/presentationml/2006/main">
+  <p:tag name="COMMONDATA" val="eyJoZGlkIjoiZjBlOGVmNDg3MjdiOTQ0NGE3NGQyMTU1MjUyNjc4YTIifQ=="/>
 </p:tagLst>
 </file>
 
@@ -2886,6 +2872,8 @@
       </a:bgFillStyleLst>
     </a:fmtScheme>
   </a:themeElements>
+  <a:objectDefaults/>
+  <a:extraClrSchemeLst/>
   <a:extLst>
     <a:ext uri="{05A4C25C-085E-4340-85A3-A5531E510DB2}">
       <thm15:themeFamily xmlns:thm15="http://schemas.microsoft.com/office/thememl/2012/main" name="Office Theme" id="{62F939B6-93AF-4DB8-9C6B-D6C7DFDC589F}" vid="{4A3C46E8-61CC-4603-A589-7422A47A8E4A}"/>
@@ -3145,6 +3133,8 @@
       </a:bgFillStyleLst>
     </a:fmtScheme>
   </a:themeElements>
+  <a:objectDefaults/>
+  <a:extraClrSchemeLst/>
   <a:extLst>
     <a:ext uri="{05A4C25C-085E-4340-85A3-A5531E510DB2}">
       <thm15:themeFamily xmlns:thm15="http://schemas.microsoft.com/office/thememl/2012/main" name="Office Theme" id="{62F939B6-93AF-4DB8-9C6B-D6C7DFDC589F}" vid="{4A3C46E8-61CC-4603-A589-7422A47A8E4A}"/>
@@ -3404,6 +3394,8 @@
       </a:bgFillStyleLst>
     </a:fmtScheme>
   </a:themeElements>
+  <a:objectDefaults/>
+  <a:extraClrSchemeLst/>
   <a:extLst>
     <a:ext uri="{05A4C25C-085E-4340-85A3-A5531E510DB2}">
       <thm15:themeFamily xmlns:thm15="http://schemas.microsoft.com/office/thememl/2012/main" name="Office Theme" id="{62F939B6-93AF-4DB8-9C6B-D6C7DFDC589F}" vid="{4A3C46E8-61CC-4603-A589-7422A47A8E4A}"/>

</xml_diff>